<commit_message>
ref script run success
</commit_message>
<xml_diff>
--- a/bitcoin_market_report_nov2024_v2.pptx
+++ b/bitcoin_market_report_nov2024_v2.pptx
@@ -14,6 +14,7 @@
     <p:sldId id="262" r:id="rId13"/>
     <p:sldId id="263" r:id="rId14"/>
     <p:sldId id="264" r:id="rId15"/>
+    <p:sldId id="265" r:id="rId16"/>
   </p:sldIdLst>
   <p:sldSz cx="9144000" cy="6858000" type="screen4x3"/>
   <p:notesSz cx="6858000" cy="9144000"/>
@@ -3168,6 +3169,128 @@
 </p:sld>
 </file>
 
+<file path=ppt/slides/slide10.xml><?xml version="1.0" encoding="utf-8"?>
+<p:sld xmlns:a="http://schemas.openxmlformats.org/drawingml/2006/main" xmlns:p="http://schemas.openxmlformats.org/presentationml/2006/main" xmlns:r="http://schemas.openxmlformats.org/officeDocument/2006/relationships">
+  <p:cSld>
+    <p:spTree>
+      <p:nvGrpSpPr>
+        <p:cNvPr id="1" name=""/>
+        <p:cNvGrpSpPr/>
+        <p:nvPr/>
+      </p:nvGrpSpPr>
+      <p:grpSpPr/>
+      <p:sp>
+        <p:nvSpPr>
+          <p:cNvPr id="2" name="Title 1"/>
+          <p:cNvSpPr>
+            <a:spLocks noGrp="1"/>
+          </p:cNvSpPr>
+          <p:nvPr>
+            <p:ph type="title"/>
+          </p:nvPr>
+        </p:nvSpPr>
+        <p:spPr/>
+        <p:txBody>
+          <a:bodyPr/>
+          <a:lstStyle/>
+          <a:p/>
+        </p:txBody>
+      </p:sp>
+      <p:sp>
+        <p:nvSpPr>
+          <p:cNvPr id="3" name="Content Placeholder 2"/>
+          <p:cNvSpPr>
+            <a:spLocks noGrp="1"/>
+          </p:cNvSpPr>
+          <p:nvPr>
+            <p:ph idx="1"/>
+          </p:nvPr>
+        </p:nvSpPr>
+        <p:spPr/>
+        <p:txBody>
+          <a:bodyPr/>
+          <a:lstStyle/>
+          <a:p/>
+        </p:txBody>
+      </p:sp>
+      <p:sp>
+        <p:nvSpPr>
+          <p:cNvPr id="4" name="TextBox 3"/>
+          <p:cNvSpPr txBox="1"/>
+          <p:nvPr/>
+        </p:nvSpPr>
+        <p:spPr>
+          <a:xfrm>
+            <a:off x="609584" y="6309360"/>
+            <a:ext cx="7315017" cy="342900"/>
+          </a:xfrm>
+          <a:prstGeom prst="rect">
+            <a:avLst/>
+          </a:prstGeom>
+          <a:noFill/>
+        </p:spPr>
+        <p:txBody>
+          <a:bodyPr wrap="square">
+            <a:spAutoFit/>
+          </a:bodyPr>
+          <a:lstStyle/>
+          <a:p>
+            <a:pPr algn="l">
+              <a:defRPr sz="1000" b="0" i="0">
+                <a:solidFill>
+                  <a:srgbClr val="595959"/>
+                </a:solidFill>
+              </a:defRPr>
+            </a:pPr>
+            <a:r>
+              <a:t>Bitcoin Market Report • November 2024</a:t>
+            </a:r>
+          </a:p>
+        </p:txBody>
+      </p:sp>
+      <p:sp>
+        <p:nvSpPr>
+          <p:cNvPr id="5" name="TextBox 4"/>
+          <p:cNvSpPr txBox="1"/>
+          <p:nvPr/>
+        </p:nvSpPr>
+        <p:spPr>
+          <a:xfrm>
+            <a:off x="11216359" y="6309360"/>
+            <a:ext cx="609584" cy="342900"/>
+          </a:xfrm>
+          <a:prstGeom prst="rect">
+            <a:avLst/>
+          </a:prstGeom>
+          <a:noFill/>
+        </p:spPr>
+        <p:txBody>
+          <a:bodyPr wrap="square">
+            <a:spAutoFit/>
+          </a:bodyPr>
+          <a:lstStyle/>
+          <a:p>
+            <a:pPr algn="l">
+              <a:defRPr sz="1000" b="0" i="0">
+                <a:solidFill>
+                  <a:srgbClr val="595959"/>
+                </a:solidFill>
+              </a:defRPr>
+            </a:pPr>
+            <a:r>
+              <a:t>10</a:t>
+            </a:r>
+          </a:p>
+        </p:txBody>
+      </p:sp>
+    </p:spTree>
+  </p:cSld>
+  <p:clrMapOvr>
+    <a:masterClrMapping/>
+  </p:clrMapOvr>
+</p:sld>
+</file>
+
 <file path=ppt/slides/slide2.xml><?xml version="1.0" encoding="utf-8"?>
 <p:sld xmlns:a="http://schemas.openxmlformats.org/drawingml/2006/main" xmlns:p="http://schemas.openxmlformats.org/presentationml/2006/main" xmlns:r="http://schemas.openxmlformats.org/officeDocument/2006/relationships">
   <p:cSld>
@@ -3555,6 +3678,148 @@
         </p:nvSpPr>
         <p:spPr>
           <a:xfrm>
+            <a:off x="975335" y="1714500"/>
+            <a:ext cx="10241023" cy="3771900"/>
+          </a:xfrm>
+          <a:prstGeom prst="rect">
+            <a:avLst/>
+          </a:prstGeom>
+          <a:noFill/>
+        </p:spPr>
+        <p:txBody>
+          <a:bodyPr wrap="square">
+            <a:spAutoFit/>
+          </a:bodyPr>
+          <a:lstStyle/>
+          <a:p>
+            <a:pPr>
+              <a:defRPr sz="1800"/>
+            </a:pPr>
+            <a:r>
+              <a:t>Price acceleration from $120K+ to &lt;$95K driven by short-term holders</a:t>
+            </a:r>
+          </a:p>
+          <a:p>
+            <a:pPr>
+              <a:defRPr sz="1800"/>
+            </a:pPr>
+            <a:r>
+              <a:t>Selling at a loss triggered forced liquidations and deleveraging</a:t>
+            </a:r>
+          </a:p>
+          <a:p>
+            <a:pPr>
+              <a:defRPr sz="1800"/>
+            </a:pPr>
+            <a:r>
+              <a:t>Long-term holders took profits but NOT mass distribution</a:t>
+            </a:r>
+          </a:p>
+          <a:p>
+            <a:pPr>
+              <a:defRPr sz="1800"/>
+            </a:pPr>
+            <a:r>
+              <a:t>Pattern differs from typical bear market cycle tops</a:t>
+            </a:r>
+          </a:p>
+          <a:p>
+            <a:pPr>
+              <a:defRPr sz="1800"/>
+            </a:pPr>
+            <a:r>
+              <a:t>Short-term holder capitulation signals potential market bottom</a:t>
+            </a:r>
+          </a:p>
+        </p:txBody>
+      </p:sp>
+      <p:sp>
+        <p:nvSpPr>
+          <p:cNvPr id="8" name="Rectangle 7"/>
+          <p:cNvSpPr/>
+          <p:nvPr/>
+        </p:nvSpPr>
+        <p:spPr>
+          <a:xfrm>
+            <a:off x="8716975" y="5669280"/>
+            <a:ext cx="2926080" cy="914400"/>
+          </a:xfrm>
+          <a:prstGeom prst="rect">
+            <a:avLst/>
+          </a:prstGeom>
+          <a:solidFill>
+            <a:srgbClr val="ED7D31"/>
+          </a:solidFill>
+          <a:ln>
+            <a:noFill/>
+          </a:ln>
+        </p:spPr>
+        <p:style>
+          <a:lnRef idx="1">
+            <a:schemeClr val="accent1"/>
+          </a:lnRef>
+          <a:fillRef idx="3">
+            <a:schemeClr val="accent1"/>
+          </a:fillRef>
+          <a:effectRef idx="2">
+            <a:schemeClr val="accent1"/>
+          </a:effectRef>
+          <a:fontRef idx="minor">
+            <a:schemeClr val="lt1"/>
+          </a:fontRef>
+        </p:style>
+        <p:txBody>
+          <a:bodyPr rtlCol="0" anchor="ctr"/>
+          <a:lstStyle/>
+          <a:p>
+            <a:pPr algn="ctr"/>
+          </a:p>
+        </p:txBody>
+      </p:sp>
+      <p:sp>
+        <p:nvSpPr>
+          <p:cNvPr id="9" name="TextBox 8"/>
+          <p:cNvSpPr txBox="1"/>
+          <p:nvPr/>
+        </p:nvSpPr>
+        <p:spPr>
+          <a:xfrm>
+            <a:off x="8808415" y="5806440"/>
+            <a:ext cx="2743200" cy="640080"/>
+          </a:xfrm>
+          <a:prstGeom prst="rect">
+            <a:avLst/>
+          </a:prstGeom>
+          <a:noFill/>
+        </p:spPr>
+        <p:txBody>
+          <a:bodyPr wrap="square">
+            <a:spAutoFit/>
+          </a:bodyPr>
+          <a:lstStyle/>
+          <a:p>
+            <a:pPr algn="l">
+              <a:defRPr sz="1800" b="1" i="0">
+                <a:solidFill>
+                  <a:srgbClr val="FFFFFF"/>
+                </a:solidFill>
+                <a:latin typeface="Calibri"/>
+              </a:defRPr>
+            </a:pPr>
+            <a:r>
+              <a:t>Price Drop: $120K → $95K</a:t>
+            </a:r>
+          </a:p>
+        </p:txBody>
+      </p:sp>
+      <p:sp>
+        <p:nvSpPr>
+          <p:cNvPr id="10" name="TextBox 9"/>
+          <p:cNvSpPr txBox="1"/>
+          <p:nvPr/>
+        </p:nvSpPr>
+        <p:spPr>
+          <a:xfrm>
             <a:off x="609584" y="6309360"/>
             <a:ext cx="7315017" cy="342900"/>
           </a:xfrm>
@@ -3584,7 +3849,7 @@
       </p:sp>
       <p:sp>
         <p:nvSpPr>
-          <p:cNvPr id="8" name="TextBox 7"/>
+          <p:cNvPr id="11" name="TextBox 10"/>
           <p:cNvSpPr txBox="1"/>
           <p:nvPr/>
         </p:nvSpPr>

</xml_diff>